<commit_message>
week 11: typos and fixes
</commit_message>
<xml_diff>
--- a/week_11/week_11.pptx
+++ b/week_11/week_11.pptx
@@ -207,7 +207,7 @@
           <a:p>
             <a:fld id="{A756DEA0-F944-5946-9B95-BC7B5255CD05}" type="datetimeFigureOut">
               <a:rPr lang="en-US" smtClean="0"/>
-              <a:t>4/6/16</a:t>
+              <a:t>4/7/16</a:t>
             </a:fld>
             <a:endParaRPr lang="en-US"/>
           </a:p>
@@ -1147,7 +1147,7 @@
           <a:p>
             <a:fld id="{9E016143-E03C-4CFD-AFDC-14E5BDEA754C}" type="datetimeFigureOut">
               <a:rPr lang="en-US" dirty="0"/>
-              <a:t>4/6/16</a:t>
+              <a:t>4/7/16</a:t>
             </a:fld>
             <a:endParaRPr lang="en-US" dirty="0"/>
           </a:p>
@@ -1371,7 +1371,7 @@
           <a:p>
             <a:fld id="{C033E54A-A8CA-48C1-9504-691B58049D29}" type="datetimeFigureOut">
               <a:rPr lang="en-US" dirty="0"/>
-              <a:t>4/6/16</a:t>
+              <a:t>4/7/16</a:t>
             </a:fld>
             <a:endParaRPr lang="en-US" dirty="0"/>
           </a:p>
@@ -1546,7 +1546,7 @@
           <a:p>
             <a:fld id="{B5F6C806-BBF7-471C-9527-881CE2266695}" type="datetimeFigureOut">
               <a:rPr lang="en-US" dirty="0"/>
-              <a:t>4/6/16</a:t>
+              <a:t>4/7/16</a:t>
             </a:fld>
             <a:endParaRPr lang="en-US" dirty="0"/>
           </a:p>
@@ -1711,7 +1711,7 @@
           <a:p>
             <a:fld id="{78C94063-DF36-4330-A365-08DA1FA5B7D6}" type="datetimeFigureOut">
               <a:rPr lang="en-US" dirty="0"/>
-              <a:t>4/6/16</a:t>
+              <a:t>4/7/16</a:t>
             </a:fld>
             <a:endParaRPr lang="en-US" dirty="0"/>
           </a:p>
@@ -1960,7 +1960,7 @@
           <a:p>
             <a:fld id="{908A7C6C-0F39-4D70-8E8D-FE5B9C95FA73}" type="datetimeFigureOut">
               <a:rPr lang="en-US" dirty="0"/>
-              <a:t>4/6/16</a:t>
+              <a:t>4/7/16</a:t>
             </a:fld>
             <a:endParaRPr lang="en-US" dirty="0"/>
           </a:p>
@@ -2281,7 +2281,7 @@
           <a:p>
             <a:fld id="{DFCFA4AC-08CC-42CE-BD01-C191750A04EC}" type="datetimeFigureOut">
               <a:rPr lang="en-US" dirty="0"/>
-              <a:t>4/6/16</a:t>
+              <a:t>4/7/16</a:t>
             </a:fld>
             <a:endParaRPr lang="en-US" dirty="0"/>
           </a:p>
@@ -2727,7 +2727,7 @@
           <a:p>
             <a:fld id="{1BA7A723-92A7-435B-B681-F25B092FEFEB}" type="datetimeFigureOut">
               <a:rPr lang="en-US" dirty="0"/>
-              <a:t>4/6/16</a:t>
+              <a:t>4/7/16</a:t>
             </a:fld>
             <a:endParaRPr lang="en-US" dirty="0"/>
           </a:p>
@@ -2840,7 +2840,7 @@
           <a:p>
             <a:fld id="{4F170639-886C-4FCF-9EAB-ABB5DA3F3F4A}" type="datetimeFigureOut">
               <a:rPr lang="en-US" dirty="0"/>
-              <a:t>4/6/16</a:t>
+              <a:t>4/7/16</a:t>
             </a:fld>
             <a:endParaRPr lang="en-US" dirty="0"/>
           </a:p>
@@ -2930,7 +2930,7 @@
           <a:p>
             <a:fld id="{22230651-31F4-45D2-98AE-A2108F41BC07}" type="datetimeFigureOut">
               <a:rPr lang="en-US" dirty="0"/>
-              <a:t>4/6/16</a:t>
+              <a:t>4/7/16</a:t>
             </a:fld>
             <a:endParaRPr lang="en-US" dirty="0"/>
           </a:p>
@@ -3212,7 +3212,7 @@
           <a:p>
             <a:fld id="{6F53789A-C914-4DB1-8815-80B5EC7335C5}" type="datetimeFigureOut">
               <a:rPr lang="en-US" dirty="0"/>
-              <a:t>4/6/16</a:t>
+              <a:t>4/7/16</a:t>
             </a:fld>
             <a:endParaRPr lang="en-US" dirty="0"/>
           </a:p>
@@ -3532,7 +3532,7 @@
           <a:p>
             <a:fld id="{5E6440AA-91A0-436F-8FDB-C0F939DCAE21}" type="datetimeFigureOut">
               <a:rPr lang="en-US" dirty="0"/>
-              <a:t>4/6/16</a:t>
+              <a:t>4/7/16</a:t>
             </a:fld>
             <a:endParaRPr lang="en-US" dirty="0"/>
           </a:p>
@@ -3781,7 +3781,7 @@
           <a:p>
             <a:fld id="{0E59FD0C-5451-4CA0-86AF-E70AE3279989}" type="datetimeFigureOut">
               <a:rPr lang="en-US" dirty="0"/>
-              <a:t>4/6/16</a:t>
+              <a:t>4/7/16</a:t>
             </a:fld>
             <a:endParaRPr lang="en-US" dirty="0"/>
           </a:p>
@@ -4308,7 +4308,6 @@
               <a:rPr lang="en-US" dirty="0" smtClean="0"/>
               <a:t>Week 11: Listeners and Anonymous Classes</a:t>
             </a:r>
-            <a:endParaRPr lang="en-US" dirty="0" smtClean="0"/>
           </a:p>
           <a:p>
             <a:r>
@@ -4405,7 +4404,6 @@
               <a:rPr lang="en-US" sz="2400" dirty="0" smtClean="0"/>
               <a:t>Often used in GUI frameworks to notify other objects of changes to GUI objects</a:t>
             </a:r>
-            <a:endParaRPr lang="en-US" sz="2400" dirty="0" smtClean="0"/>
           </a:p>
         </p:txBody>
       </p:sp>
@@ -4554,7 +4552,6 @@
               <a:rPr lang="en-US" sz="3200" dirty="0"/>
               <a:t> and demonstrate an update of pressure data from the instance.</a:t>
             </a:r>
-            <a:endParaRPr lang="en-US" sz="3200" dirty="0"/>
           </a:p>
         </p:txBody>
       </p:sp>
@@ -4634,11 +4631,7 @@
             </a:r>
             <a:r>
               <a:rPr lang="en-US" sz="2800" dirty="0" smtClean="0"/>
-              <a:t>, pp. </a:t>
-            </a:r>
-            <a:r>
-              <a:rPr lang="en-US" sz="2800" dirty="0" smtClean="0"/>
-              <a:t>189-202</a:t>
+              <a:t>, pp. 189-202</a:t>
             </a:r>
             <a:endParaRPr lang="en-US" sz="2800" i="1" dirty="0"/>
           </a:p>
@@ -4863,7 +4856,6 @@
               <a:rPr lang="en-US" sz="3000" dirty="0" smtClean="0"/>
               <a:t>Local classes</a:t>
             </a:r>
-            <a:endParaRPr lang="en-US" sz="3000" dirty="0" smtClean="0"/>
           </a:p>
         </p:txBody>
       </p:sp>
@@ -5021,7 +5013,7 @@
                 <a:ea typeface="Consolas" charset="0"/>
                 <a:cs typeface="Consolas" charset="0"/>
               </a:rPr>
-              <a:t>outerClass</a:t>
+              <a:t>OuterClass</a:t>
             </a:r>
             <a:r>
               <a:rPr lang="en-US" dirty="0" smtClean="0">
@@ -5032,7 +5024,18 @@
                 <a:ea typeface="Consolas" charset="0"/>
                 <a:cs typeface="Consolas" charset="0"/>
               </a:rPr>
-              <a:t> {</a:t>
+              <a:t> </a:t>
+            </a:r>
+            <a:r>
+              <a:rPr lang="en-US" dirty="0" smtClean="0">
+                <a:solidFill>
+                  <a:srgbClr val="FF0000"/>
+                </a:solidFill>
+                <a:latin typeface="Consolas" charset="0"/>
+                <a:ea typeface="Consolas" charset="0"/>
+                <a:cs typeface="Consolas" charset="0"/>
+              </a:rPr>
+              <a:t>{</a:t>
             </a:r>
           </a:p>
           <a:p>
@@ -5295,6 +5298,17 @@
               <a:t>   static class </a:t>
             </a:r>
             <a:r>
+              <a:rPr lang="en-US" dirty="0" err="1">
+                <a:solidFill>
+                  <a:srgbClr val="0070C0"/>
+                </a:solidFill>
+                <a:latin typeface="Consolas" charset="0"/>
+                <a:ea typeface="Consolas" charset="0"/>
+                <a:cs typeface="Consolas" charset="0"/>
+              </a:rPr>
+              <a:t>I</a:t>
+            </a:r>
+            <a:r>
               <a:rPr lang="en-US" dirty="0" err="1" smtClean="0">
                 <a:solidFill>
                   <a:srgbClr val="0070C0"/>
@@ -5303,7 +5317,7 @@
                 <a:ea typeface="Consolas" charset="0"/>
                 <a:cs typeface="Consolas" charset="0"/>
               </a:rPr>
-              <a:t>innerClass</a:t>
+              <a:t>nnerClass</a:t>
             </a:r>
             <a:r>
               <a:rPr lang="en-US" dirty="0" smtClean="0">
@@ -5314,7 +5328,18 @@
                 <a:ea typeface="Consolas" charset="0"/>
                 <a:cs typeface="Consolas" charset="0"/>
               </a:rPr>
-              <a:t> {</a:t>
+              <a:t> </a:t>
+            </a:r>
+            <a:r>
+              <a:rPr lang="en-US" dirty="0" smtClean="0">
+                <a:solidFill>
+                  <a:srgbClr val="0070C0"/>
+                </a:solidFill>
+                <a:latin typeface="Consolas" charset="0"/>
+                <a:ea typeface="Consolas" charset="0"/>
+                <a:cs typeface="Consolas" charset="0"/>
+              </a:rPr>
+              <a:t>{</a:t>
             </a:r>
           </a:p>
           <a:p>
@@ -5931,7 +5956,7 @@
                 <a:ea typeface="Consolas" charset="0"/>
                 <a:cs typeface="Consolas" charset="0"/>
               </a:rPr>
-              <a:t>outerClass</a:t>
+              <a:t>OuterClass</a:t>
             </a:r>
             <a:r>
               <a:rPr lang="en-US" dirty="0" smtClean="0">
@@ -5942,7 +5967,18 @@
                 <a:ea typeface="Consolas" charset="0"/>
                 <a:cs typeface="Consolas" charset="0"/>
               </a:rPr>
-              <a:t> {</a:t>
+              <a:t> </a:t>
+            </a:r>
+            <a:r>
+              <a:rPr lang="en-US" dirty="0" smtClean="0">
+                <a:solidFill>
+                  <a:srgbClr val="FF0000"/>
+                </a:solidFill>
+                <a:latin typeface="Consolas" charset="0"/>
+                <a:ea typeface="Consolas" charset="0"/>
+                <a:cs typeface="Consolas" charset="0"/>
+              </a:rPr>
+              <a:t>{</a:t>
             </a:r>
           </a:p>
           <a:p>
@@ -6202,7 +6238,7 @@
                 <a:ea typeface="Consolas" charset="0"/>
                 <a:cs typeface="Consolas" charset="0"/>
               </a:rPr>
-              <a:t>innerClass</a:t>
+              <a:t>InnerClass</a:t>
             </a:r>
             <a:r>
               <a:rPr lang="en-US" dirty="0" smtClean="0">
@@ -6213,7 +6249,18 @@
                 <a:ea typeface="Consolas" charset="0"/>
                 <a:cs typeface="Consolas" charset="0"/>
               </a:rPr>
-              <a:t> {</a:t>
+              <a:t> </a:t>
+            </a:r>
+            <a:r>
+              <a:rPr lang="en-US" dirty="0" smtClean="0">
+                <a:solidFill>
+                  <a:srgbClr val="0070C0"/>
+                </a:solidFill>
+                <a:latin typeface="Consolas" charset="0"/>
+                <a:ea typeface="Consolas" charset="0"/>
+                <a:cs typeface="Consolas" charset="0"/>
+              </a:rPr>
+              <a:t>{</a:t>
             </a:r>
           </a:p>
           <a:p>
@@ -6963,6 +7010,17 @@
               <a:t>class </a:t>
             </a:r>
             <a:r>
+              <a:rPr lang="en-US" dirty="0" err="1">
+                <a:solidFill>
+                  <a:srgbClr val="FF0000"/>
+                </a:solidFill>
+                <a:latin typeface="Consolas" charset="0"/>
+                <a:ea typeface="Consolas" charset="0"/>
+                <a:cs typeface="Consolas" charset="0"/>
+              </a:rPr>
+              <a:t>O</a:t>
+            </a:r>
+            <a:r>
               <a:rPr lang="en-US" dirty="0" err="1" smtClean="0">
                 <a:solidFill>
                   <a:srgbClr val="FF0000"/>
@@ -6971,7 +7029,7 @@
                 <a:ea typeface="Consolas" charset="0"/>
                 <a:cs typeface="Consolas" charset="0"/>
               </a:rPr>
-              <a:t>outerClass</a:t>
+              <a:t>uterClass</a:t>
             </a:r>
             <a:r>
               <a:rPr lang="en-US" dirty="0" smtClean="0">
@@ -6982,7 +7040,18 @@
                 <a:ea typeface="Consolas" charset="0"/>
                 <a:cs typeface="Consolas" charset="0"/>
               </a:rPr>
-              <a:t> {</a:t>
+              <a:t> </a:t>
+            </a:r>
+            <a:r>
+              <a:rPr lang="en-US" dirty="0" smtClean="0">
+                <a:solidFill>
+                  <a:srgbClr val="FF0000"/>
+                </a:solidFill>
+                <a:latin typeface="Consolas" charset="0"/>
+                <a:ea typeface="Consolas" charset="0"/>
+                <a:cs typeface="Consolas" charset="0"/>
+              </a:rPr>
+              <a:t>{</a:t>
             </a:r>
           </a:p>
           <a:p>
@@ -7007,7 +7076,29 @@
                 <a:ea typeface="Consolas" charset="0"/>
                 <a:cs typeface="Consolas" charset="0"/>
               </a:rPr>
-              <a:t>    void instance Method() {</a:t>
+              <a:t>    void </a:t>
+            </a:r>
+            <a:r>
+              <a:rPr lang="en-US" dirty="0" err="1" smtClean="0">
+                <a:solidFill>
+                  <a:srgbClr val="FF0000"/>
+                </a:solidFill>
+                <a:latin typeface="Consolas" charset="0"/>
+                <a:ea typeface="Consolas" charset="0"/>
+                <a:cs typeface="Consolas" charset="0"/>
+              </a:rPr>
+              <a:t>instanceMethod</a:t>
+            </a:r>
+            <a:r>
+              <a:rPr lang="en-US" dirty="0" smtClean="0">
+                <a:solidFill>
+                  <a:srgbClr val="FF0000"/>
+                </a:solidFill>
+                <a:latin typeface="Consolas" charset="0"/>
+                <a:ea typeface="Consolas" charset="0"/>
+                <a:cs typeface="Consolas" charset="0"/>
+              </a:rPr>
+              <a:t>() {</a:t>
             </a:r>
           </a:p>
           <a:p>
@@ -7751,7 +7842,7 @@
                 <a:ea typeface="Consolas" charset="0"/>
                 <a:cs typeface="Consolas" charset="0"/>
               </a:rPr>
-              <a:t>outerClass</a:t>
+              <a:t>OuterClass</a:t>
             </a:r>
             <a:r>
               <a:rPr lang="en-US" dirty="0" smtClean="0">
@@ -7762,7 +7853,18 @@
                 <a:ea typeface="Consolas" charset="0"/>
                 <a:cs typeface="Consolas" charset="0"/>
               </a:rPr>
-              <a:t> {</a:t>
+              <a:t> </a:t>
+            </a:r>
+            <a:r>
+              <a:rPr lang="en-US" dirty="0" smtClean="0">
+                <a:solidFill>
+                  <a:srgbClr val="FF0000"/>
+                </a:solidFill>
+                <a:latin typeface="Consolas" charset="0"/>
+                <a:ea typeface="Consolas" charset="0"/>
+                <a:cs typeface="Consolas" charset="0"/>
+              </a:rPr>
+              <a:t>{</a:t>
             </a:r>
           </a:p>
           <a:p>
@@ -7845,7 +7947,7 @@
                 <a:ea typeface="Consolas" charset="0"/>
                 <a:cs typeface="Consolas" charset="0"/>
               </a:rPr>
-              <a:t>innerClass</a:t>
+              <a:t>InnerClass</a:t>
             </a:r>
             <a:r>
               <a:rPr lang="en-US" dirty="0" smtClean="0">
@@ -7856,7 +7958,18 @@
                 <a:ea typeface="Consolas" charset="0"/>
                 <a:cs typeface="Consolas" charset="0"/>
               </a:rPr>
-              <a:t> implements Displayable {</a:t>
+              <a:t> </a:t>
+            </a:r>
+            <a:r>
+              <a:rPr lang="en-US" dirty="0" smtClean="0">
+                <a:solidFill>
+                  <a:srgbClr val="0070C0"/>
+                </a:solidFill>
+                <a:latin typeface="Consolas" charset="0"/>
+                <a:ea typeface="Consolas" charset="0"/>
+                <a:cs typeface="Consolas" charset="0"/>
+              </a:rPr>
+              <a:t>implements Displayable {</a:t>
             </a:r>
           </a:p>
           <a:p>
@@ -8091,6 +8204,17 @@
               <a:t>return new </a:t>
             </a:r>
             <a:r>
+              <a:rPr lang="en-US" dirty="0" err="1">
+                <a:solidFill>
+                  <a:srgbClr val="FF0000"/>
+                </a:solidFill>
+                <a:latin typeface="Consolas" charset="0"/>
+                <a:ea typeface="Consolas" charset="0"/>
+                <a:cs typeface="Consolas" charset="0"/>
+              </a:rPr>
+              <a:t>I</a:t>
+            </a:r>
+            <a:r>
               <a:rPr lang="en-US" dirty="0" err="1" smtClean="0">
                 <a:solidFill>
                   <a:srgbClr val="FF0000"/>
@@ -8099,7 +8223,7 @@
                 <a:ea typeface="Consolas" charset="0"/>
                 <a:cs typeface="Consolas" charset="0"/>
               </a:rPr>
-              <a:t>innerClass</a:t>
+              <a:t>nnerClass</a:t>
             </a:r>
             <a:r>
               <a:rPr lang="en-US" dirty="0" smtClean="0">

</xml_diff>

<commit_message>
week 11: fix typos
</commit_message>
<xml_diff>
--- a/week_11/week_11.pptx
+++ b/week_11/week_11.pptx
@@ -207,7 +207,7 @@
           <a:p>
             <a:fld id="{A756DEA0-F944-5946-9B95-BC7B5255CD05}" type="datetimeFigureOut">
               <a:rPr lang="en-US" smtClean="0"/>
-              <a:t>4/7/16</a:t>
+              <a:t>11/7/16</a:t>
             </a:fld>
             <a:endParaRPr lang="en-US"/>
           </a:p>
@@ -519,7 +519,7 @@
           <a:bodyPr/>
           <a:lstStyle/>
           <a:p>
-            <a:endParaRPr lang="en-US" dirty="0"/>
+            <a:endParaRPr lang="en-US"/>
           </a:p>
         </p:txBody>
       </p:sp>
@@ -540,7 +540,7 @@
           <a:p>
             <a:fld id="{0FF3EE0D-70A9-3744-80A0-179DFFBD3C67}" type="slidenum">
               <a:rPr lang="en-US" smtClean="0"/>
-              <a:t>4</a:t>
+              <a:t>1</a:t>
             </a:fld>
             <a:endParaRPr lang="en-US"/>
           </a:p>
@@ -549,7 +549,7 @@
     </p:spTree>
     <p:extLst>
       <p:ext uri="{BB962C8B-B14F-4D97-AF65-F5344CB8AC3E}">
-        <p14:creationId xmlns:p14="http://schemas.microsoft.com/office/powerpoint/2010/main" val="700590728"/>
+        <p14:creationId xmlns:p14="http://schemas.microsoft.com/office/powerpoint/2010/main" val="1379404143"/>
       </p:ext>
     </p:extLst>
   </p:cSld>
@@ -624,7 +624,7 @@
           <a:p>
             <a:fld id="{0FF3EE0D-70A9-3744-80A0-179DFFBD3C67}" type="slidenum">
               <a:rPr lang="en-US" smtClean="0"/>
-              <a:t>5</a:t>
+              <a:t>4</a:t>
             </a:fld>
             <a:endParaRPr lang="en-US"/>
           </a:p>
@@ -633,7 +633,7 @@
     </p:spTree>
     <p:extLst>
       <p:ext uri="{BB962C8B-B14F-4D97-AF65-F5344CB8AC3E}">
-        <p14:creationId xmlns:p14="http://schemas.microsoft.com/office/powerpoint/2010/main" val="651758678"/>
+        <p14:creationId xmlns:p14="http://schemas.microsoft.com/office/powerpoint/2010/main" val="700590728"/>
       </p:ext>
     </p:extLst>
   </p:cSld>
@@ -708,7 +708,7 @@
           <a:p>
             <a:fld id="{0FF3EE0D-70A9-3744-80A0-179DFFBD3C67}" type="slidenum">
               <a:rPr lang="en-US" smtClean="0"/>
-              <a:t>6</a:t>
+              <a:t>5</a:t>
             </a:fld>
             <a:endParaRPr lang="en-US"/>
           </a:p>
@@ -717,7 +717,7 @@
     </p:spTree>
     <p:extLst>
       <p:ext uri="{BB962C8B-B14F-4D97-AF65-F5344CB8AC3E}">
-        <p14:creationId xmlns:p14="http://schemas.microsoft.com/office/powerpoint/2010/main" val="1722755280"/>
+        <p14:creationId xmlns:p14="http://schemas.microsoft.com/office/powerpoint/2010/main" val="651758678"/>
       </p:ext>
     </p:extLst>
   </p:cSld>
@@ -792,7 +792,7 @@
           <a:p>
             <a:fld id="{0FF3EE0D-70A9-3744-80A0-179DFFBD3C67}" type="slidenum">
               <a:rPr lang="en-US" smtClean="0"/>
-              <a:t>7</a:t>
+              <a:t>6</a:t>
             </a:fld>
             <a:endParaRPr lang="en-US"/>
           </a:p>
@@ -801,7 +801,7 @@
     </p:spTree>
     <p:extLst>
       <p:ext uri="{BB962C8B-B14F-4D97-AF65-F5344CB8AC3E}">
-        <p14:creationId xmlns:p14="http://schemas.microsoft.com/office/powerpoint/2010/main" val="1325738581"/>
+        <p14:creationId xmlns:p14="http://schemas.microsoft.com/office/powerpoint/2010/main" val="1722755280"/>
       </p:ext>
     </p:extLst>
   </p:cSld>
@@ -876,6 +876,90 @@
           <a:p>
             <a:fld id="{0FF3EE0D-70A9-3744-80A0-179DFFBD3C67}" type="slidenum">
               <a:rPr lang="en-US" smtClean="0"/>
+              <a:t>7</a:t>
+            </a:fld>
+            <a:endParaRPr lang="en-US"/>
+          </a:p>
+        </p:txBody>
+      </p:sp>
+    </p:spTree>
+    <p:extLst>
+      <p:ext uri="{BB962C8B-B14F-4D97-AF65-F5344CB8AC3E}">
+        <p14:creationId xmlns:p14="http://schemas.microsoft.com/office/powerpoint/2010/main" val="1325738581"/>
+      </p:ext>
+    </p:extLst>
+  </p:cSld>
+  <p:clrMapOvr>
+    <a:masterClrMapping/>
+  </p:clrMapOvr>
+</p:notes>
+</file>
+
+<file path=ppt/notesSlides/notesSlide6.xml><?xml version="1.0" encoding="utf-8"?>
+<p:notes xmlns:a="http://schemas.openxmlformats.org/drawingml/2006/main" xmlns:r="http://schemas.openxmlformats.org/officeDocument/2006/relationships" xmlns:p="http://schemas.openxmlformats.org/presentationml/2006/main">
+  <p:cSld>
+    <p:spTree>
+      <p:nvGrpSpPr>
+        <p:cNvPr id="1" name=""/>
+        <p:cNvGrpSpPr/>
+        <p:nvPr/>
+      </p:nvGrpSpPr>
+      <p:grpSpPr>
+        <a:xfrm>
+          <a:off x="0" y="0"/>
+          <a:ext cx="0" cy="0"/>
+          <a:chOff x="0" y="0"/>
+          <a:chExt cx="0" cy="0"/>
+        </a:xfrm>
+      </p:grpSpPr>
+      <p:sp>
+        <p:nvSpPr>
+          <p:cNvPr id="2" name="Slide Image Placeholder 1"/>
+          <p:cNvSpPr>
+            <a:spLocks noGrp="1" noRot="1" noChangeAspect="1"/>
+          </p:cNvSpPr>
+          <p:nvPr>
+            <p:ph type="sldImg"/>
+          </p:nvPr>
+        </p:nvSpPr>
+        <p:spPr/>
+      </p:sp>
+      <p:sp>
+        <p:nvSpPr>
+          <p:cNvPr id="3" name="Notes Placeholder 2"/>
+          <p:cNvSpPr>
+            <a:spLocks noGrp="1"/>
+          </p:cNvSpPr>
+          <p:nvPr>
+            <p:ph type="body" idx="1"/>
+          </p:nvPr>
+        </p:nvSpPr>
+        <p:spPr/>
+        <p:txBody>
+          <a:bodyPr/>
+          <a:lstStyle/>
+          <a:p>
+            <a:endParaRPr lang="en-US" dirty="0"/>
+          </a:p>
+        </p:txBody>
+      </p:sp>
+      <p:sp>
+        <p:nvSpPr>
+          <p:cNvPr id="4" name="Slide Number Placeholder 3"/>
+          <p:cNvSpPr>
+            <a:spLocks noGrp="1"/>
+          </p:cNvSpPr>
+          <p:nvPr>
+            <p:ph type="sldNum" sz="quarter" idx="10"/>
+          </p:nvPr>
+        </p:nvSpPr>
+        <p:spPr/>
+        <p:txBody>
+          <a:bodyPr/>
+          <a:lstStyle/>
+          <a:p>
+            <a:fld id="{0FF3EE0D-70A9-3744-80A0-179DFFBD3C67}" type="slidenum">
+              <a:rPr lang="en-US" smtClean="0"/>
               <a:t>8</a:t>
             </a:fld>
             <a:endParaRPr lang="en-US"/>
@@ -895,7 +979,7 @@
 </p:notes>
 </file>
 
-<file path=ppt/notesSlides/notesSlide6.xml><?xml version="1.0" encoding="utf-8"?>
+<file path=ppt/notesSlides/notesSlide7.xml><?xml version="1.0" encoding="utf-8"?>
 <p:notes xmlns:a="http://schemas.openxmlformats.org/drawingml/2006/main" xmlns:r="http://schemas.openxmlformats.org/officeDocument/2006/relationships" xmlns:p="http://schemas.openxmlformats.org/presentationml/2006/main">
   <p:cSld>
     <p:spTree>
@@ -1145,9 +1229,9 @@
             </a:lvl1pPr>
           </a:lstStyle>
           <a:p>
-            <a:fld id="{9E016143-E03C-4CFD-AFDC-14E5BDEA754C}" type="datetimeFigureOut">
-              <a:rPr lang="en-US" dirty="0"/>
-              <a:t>4/7/16</a:t>
+            <a:fld id="{8B5407FB-C825-9C4D-8451-58033DE0CF2D}" type="datetime1">
+              <a:rPr lang="en-US" smtClean="0"/>
+              <a:t>11/7/16</a:t>
             </a:fld>
             <a:endParaRPr lang="en-US" dirty="0"/>
           </a:p>
@@ -1369,9 +1453,9 @@
           <a:bodyPr/>
           <a:lstStyle/>
           <a:p>
-            <a:fld id="{C033E54A-A8CA-48C1-9504-691B58049D29}" type="datetimeFigureOut">
-              <a:rPr lang="en-US" dirty="0"/>
-              <a:t>4/7/16</a:t>
+            <a:fld id="{C03C80DE-649F-CA47-8397-FF23D44ABC92}" type="datetime1">
+              <a:rPr lang="en-US" smtClean="0"/>
+              <a:t>11/7/16</a:t>
             </a:fld>
             <a:endParaRPr lang="en-US" dirty="0"/>
           </a:p>
@@ -1544,9 +1628,9 @@
           <a:bodyPr/>
           <a:lstStyle/>
           <a:p>
-            <a:fld id="{B5F6C806-BBF7-471C-9527-881CE2266695}" type="datetimeFigureOut">
-              <a:rPr lang="en-US" dirty="0"/>
-              <a:t>4/7/16</a:t>
+            <a:fld id="{474EE0A6-D4D1-FF4F-B942-9BB047377A42}" type="datetime1">
+              <a:rPr lang="en-US" smtClean="0"/>
+              <a:t>11/7/16</a:t>
             </a:fld>
             <a:endParaRPr lang="en-US" dirty="0"/>
           </a:p>
@@ -1709,9 +1793,9 @@
           <a:bodyPr/>
           <a:lstStyle/>
           <a:p>
-            <a:fld id="{78C94063-DF36-4330-A365-08DA1FA5B7D6}" type="datetimeFigureOut">
-              <a:rPr lang="en-US" dirty="0"/>
-              <a:t>4/7/16</a:t>
+            <a:fld id="{4E97B23F-FEF2-9049-955E-C458BD097967}" type="datetime1">
+              <a:rPr lang="en-US" smtClean="0"/>
+              <a:t>11/7/16</a:t>
             </a:fld>
             <a:endParaRPr lang="en-US" dirty="0"/>
           </a:p>
@@ -1958,9 +2042,9 @@
           <a:bodyPr/>
           <a:lstStyle/>
           <a:p>
-            <a:fld id="{908A7C6C-0F39-4D70-8E8D-FE5B9C95FA73}" type="datetimeFigureOut">
-              <a:rPr lang="en-US" dirty="0"/>
-              <a:t>4/7/16</a:t>
+            <a:fld id="{6E6D3AFA-72A7-D34E-B937-1D67CE948542}" type="datetime1">
+              <a:rPr lang="en-US" smtClean="0"/>
+              <a:t>11/7/16</a:t>
             </a:fld>
             <a:endParaRPr lang="en-US" dirty="0"/>
           </a:p>
@@ -2279,9 +2363,9 @@
           <a:bodyPr/>
           <a:lstStyle/>
           <a:p>
-            <a:fld id="{DFCFA4AC-08CC-42CE-BD01-C191750A04EC}" type="datetimeFigureOut">
-              <a:rPr lang="en-US" dirty="0"/>
-              <a:t>4/7/16</a:t>
+            <a:fld id="{E929E1B2-ACA4-7F4D-AA2C-5371E017FAC7}" type="datetime1">
+              <a:rPr lang="en-US" smtClean="0"/>
+              <a:t>11/7/16</a:t>
             </a:fld>
             <a:endParaRPr lang="en-US" dirty="0"/>
           </a:p>
@@ -2725,9 +2809,9 @@
           <a:bodyPr/>
           <a:lstStyle/>
           <a:p>
-            <a:fld id="{1BA7A723-92A7-435B-B681-F25B092FEFEB}" type="datetimeFigureOut">
-              <a:rPr lang="en-US" dirty="0"/>
-              <a:t>4/7/16</a:t>
+            <a:fld id="{3A7BD360-ECD2-B144-A5ED-A7C5F795C5F1}" type="datetime1">
+              <a:rPr lang="en-US" smtClean="0"/>
+              <a:t>11/7/16</a:t>
             </a:fld>
             <a:endParaRPr lang="en-US" dirty="0"/>
           </a:p>
@@ -2838,9 +2922,9 @@
           <a:bodyPr/>
           <a:lstStyle/>
           <a:p>
-            <a:fld id="{4F170639-886C-4FCF-9EAB-ABB5DA3F3F4A}" type="datetimeFigureOut">
-              <a:rPr lang="en-US" dirty="0"/>
-              <a:t>4/7/16</a:t>
+            <a:fld id="{DCE6E47C-EAD0-FA4C-8638-0AE0CDF046E0}" type="datetime1">
+              <a:rPr lang="en-US" smtClean="0"/>
+              <a:t>11/7/16</a:t>
             </a:fld>
             <a:endParaRPr lang="en-US" dirty="0"/>
           </a:p>
@@ -2928,9 +3012,9 @@
           <a:bodyPr/>
           <a:lstStyle/>
           <a:p>
-            <a:fld id="{22230651-31F4-45D2-98AE-A2108F41BC07}" type="datetimeFigureOut">
-              <a:rPr lang="en-US" dirty="0"/>
-              <a:t>4/7/16</a:t>
+            <a:fld id="{A99A3AC6-9E28-7346-97E0-EBA853790398}" type="datetime1">
+              <a:rPr lang="en-US" smtClean="0"/>
+              <a:t>11/7/16</a:t>
             </a:fld>
             <a:endParaRPr lang="en-US" dirty="0"/>
           </a:p>
@@ -3210,9 +3294,9 @@
           <a:bodyPr/>
           <a:lstStyle/>
           <a:p>
-            <a:fld id="{6F53789A-C914-4DB1-8815-80B5EC7335C5}" type="datetimeFigureOut">
-              <a:rPr lang="en-US" dirty="0"/>
-              <a:t>4/7/16</a:t>
+            <a:fld id="{730EDE96-7094-FD4E-A8E8-23591E9AE0A8}" type="datetime1">
+              <a:rPr lang="en-US" smtClean="0"/>
+              <a:t>11/7/16</a:t>
             </a:fld>
             <a:endParaRPr lang="en-US" dirty="0"/>
           </a:p>
@@ -3530,9 +3614,9 @@
           <a:bodyPr/>
           <a:lstStyle/>
           <a:p>
-            <a:fld id="{5E6440AA-91A0-436F-8FDB-C0F939DCAE21}" type="datetimeFigureOut">
-              <a:rPr lang="en-US" dirty="0"/>
-              <a:t>4/7/16</a:t>
+            <a:fld id="{705121F9-9A99-DE47-838E-F10F04A1E6EA}" type="datetime1">
+              <a:rPr lang="en-US" smtClean="0"/>
+              <a:t>11/7/16</a:t>
             </a:fld>
             <a:endParaRPr lang="en-US" dirty="0"/>
           </a:p>
@@ -3779,9 +3863,9 @@
             </a:lvl1pPr>
           </a:lstStyle>
           <a:p>
-            <a:fld id="{0E59FD0C-5451-4CA0-86AF-E70AE3279989}" type="datetimeFigureOut">
-              <a:rPr lang="en-US" dirty="0"/>
-              <a:t>4/7/16</a:t>
+            <a:fld id="{822E863E-F977-F741-8CEE-71C161BDA56D}" type="datetime1">
+              <a:rPr lang="en-US" smtClean="0"/>
+              <a:t>11/7/16</a:t>
             </a:fld>
             <a:endParaRPr lang="en-US" dirty="0"/>
           </a:p>
@@ -3886,7 +3970,7 @@
     <p:sldLayoutId id="2147483850" r:id="rId10"/>
     <p:sldLayoutId id="2147483851" r:id="rId11"/>
   </p:sldLayoutIdLst>
-  <p:hf sldNum="0" hdr="0" ftr="0" dt="0"/>
+  <p:hf hdr="0" ftr="0" dt="0"/>
   <p:txStyles>
     <p:titleStyle>
       <a:lvl1pPr algn="l" defTabSz="914400" rtl="0" eaLnBrk="1" latinLnBrk="0" hangingPunct="1">
@@ -4306,14 +4390,38 @@
           <a:p>
             <a:r>
               <a:rPr lang="en-US" dirty="0" smtClean="0"/>
-              <a:t>Week 11: Listeners and Anonymous Classes</a:t>
-            </a:r>
-          </a:p>
-          <a:p>
+              <a:t>Week 11: Listeners and Anonymous </a:t>
+            </a:r>
             <a:r>
               <a:rPr lang="en-US" dirty="0" smtClean="0"/>
-              <a:t>April 7, 2016</a:t>
-            </a:r>
+              <a:t>Classes</a:t>
+            </a:r>
+            <a:endParaRPr lang="en-US" dirty="0" smtClean="0"/>
+          </a:p>
+        </p:txBody>
+      </p:sp>
+      <p:sp>
+        <p:nvSpPr>
+          <p:cNvPr id="4" name="Slide Number Placeholder 3"/>
+          <p:cNvSpPr>
+            <a:spLocks noGrp="1"/>
+          </p:cNvSpPr>
+          <p:nvPr>
+            <p:ph type="sldNum" sz="quarter" idx="12"/>
+          </p:nvPr>
+        </p:nvSpPr>
+        <p:spPr/>
+        <p:txBody>
+          <a:bodyPr>
+            <a:normAutofit lnSpcReduction="10000"/>
+          </a:bodyPr>
+          <a:lstStyle/>
+          <a:p>
+            <a:fld id="{4FAB73BC-B049-4115-A692-8D63A059BFB8}" type="slidenum">
+              <a:rPr lang="en-US" smtClean="0"/>
+              <a:pPr/>
+              <a:t>1</a:t>
+            </a:fld>
             <a:endParaRPr lang="en-US" dirty="0"/>
           </a:p>
         </p:txBody>
@@ -4407,6 +4515,31 @@
           </a:p>
         </p:txBody>
       </p:sp>
+      <p:sp>
+        <p:nvSpPr>
+          <p:cNvPr id="2" name="Slide Number Placeholder 1"/>
+          <p:cNvSpPr>
+            <a:spLocks noGrp="1"/>
+          </p:cNvSpPr>
+          <p:nvPr>
+            <p:ph type="sldNum" sz="quarter" idx="12"/>
+          </p:nvPr>
+        </p:nvSpPr>
+        <p:spPr/>
+        <p:txBody>
+          <a:bodyPr>
+            <a:normAutofit lnSpcReduction="10000"/>
+          </a:bodyPr>
+          <a:lstStyle/>
+          <a:p>
+            <a:fld id="{4FAB73BC-B049-4115-A692-8D63A059BFB8}" type="slidenum">
+              <a:rPr lang="en-US" smtClean="0"/>
+              <a:t>10</a:t>
+            </a:fld>
+            <a:endParaRPr lang="en-US" dirty="0"/>
+          </a:p>
+        </p:txBody>
+      </p:sp>
     </p:spTree>
     <p:extLst>
       <p:ext uri="{BB962C8B-B14F-4D97-AF65-F5344CB8AC3E}">
@@ -4555,6 +4688,31 @@
           </a:p>
         </p:txBody>
       </p:sp>
+      <p:sp>
+        <p:nvSpPr>
+          <p:cNvPr id="4" name="Slide Number Placeholder 3"/>
+          <p:cNvSpPr>
+            <a:spLocks noGrp="1"/>
+          </p:cNvSpPr>
+          <p:nvPr>
+            <p:ph type="sldNum" sz="quarter" idx="12"/>
+          </p:nvPr>
+        </p:nvSpPr>
+        <p:spPr/>
+        <p:txBody>
+          <a:bodyPr>
+            <a:normAutofit lnSpcReduction="10000"/>
+          </a:bodyPr>
+          <a:lstStyle/>
+          <a:p>
+            <a:fld id="{4FAB73BC-B049-4115-A692-8D63A059BFB8}" type="slidenum">
+              <a:rPr lang="en-US" smtClean="0"/>
+              <a:t>11</a:t>
+            </a:fld>
+            <a:endParaRPr lang="en-US" dirty="0"/>
+          </a:p>
+        </p:txBody>
+      </p:sp>
     </p:spTree>
     <p:extLst>
       <p:ext uri="{BB962C8B-B14F-4D97-AF65-F5344CB8AC3E}">
@@ -4637,6 +4795,31 @@
           </a:p>
         </p:txBody>
       </p:sp>
+      <p:sp>
+        <p:nvSpPr>
+          <p:cNvPr id="4" name="Slide Number Placeholder 3"/>
+          <p:cNvSpPr>
+            <a:spLocks noGrp="1"/>
+          </p:cNvSpPr>
+          <p:nvPr>
+            <p:ph type="sldNum" sz="quarter" idx="12"/>
+          </p:nvPr>
+        </p:nvSpPr>
+        <p:spPr/>
+        <p:txBody>
+          <a:bodyPr>
+            <a:normAutofit lnSpcReduction="10000"/>
+          </a:bodyPr>
+          <a:lstStyle/>
+          <a:p>
+            <a:fld id="{4FAB73BC-B049-4115-A692-8D63A059BFB8}" type="slidenum">
+              <a:rPr lang="en-US" smtClean="0"/>
+              <a:t>2</a:t>
+            </a:fld>
+            <a:endParaRPr lang="en-US" dirty="0"/>
+          </a:p>
+        </p:txBody>
+      </p:sp>
     </p:spTree>
     <p:extLst>
       <p:ext uri="{BB962C8B-B14F-4D97-AF65-F5344CB8AC3E}">
@@ -4709,6 +4892,31 @@
           </a:p>
         </p:txBody>
       </p:sp>
+      <p:sp>
+        <p:nvSpPr>
+          <p:cNvPr id="2" name="Slide Number Placeholder 1"/>
+          <p:cNvSpPr>
+            <a:spLocks noGrp="1"/>
+          </p:cNvSpPr>
+          <p:nvPr>
+            <p:ph type="sldNum" sz="quarter" idx="12"/>
+          </p:nvPr>
+        </p:nvSpPr>
+        <p:spPr/>
+        <p:txBody>
+          <a:bodyPr>
+            <a:normAutofit lnSpcReduction="10000"/>
+          </a:bodyPr>
+          <a:lstStyle/>
+          <a:p>
+            <a:fld id="{4FAB73BC-B049-4115-A692-8D63A059BFB8}" type="slidenum">
+              <a:rPr lang="en-US" smtClean="0"/>
+              <a:t>3</a:t>
+            </a:fld>
+            <a:endParaRPr lang="en-US" dirty="0"/>
+          </a:p>
+        </p:txBody>
+      </p:sp>
     </p:spTree>
     <p:extLst>
       <p:ext uri="{BB962C8B-B14F-4D97-AF65-F5344CB8AC3E}">
@@ -4859,6 +5067,31 @@
           </a:p>
         </p:txBody>
       </p:sp>
+      <p:sp>
+        <p:nvSpPr>
+          <p:cNvPr id="4" name="Slide Number Placeholder 3"/>
+          <p:cNvSpPr>
+            <a:spLocks noGrp="1"/>
+          </p:cNvSpPr>
+          <p:nvPr>
+            <p:ph type="sldNum" sz="quarter" idx="12"/>
+          </p:nvPr>
+        </p:nvSpPr>
+        <p:spPr/>
+        <p:txBody>
+          <a:bodyPr>
+            <a:normAutofit lnSpcReduction="10000"/>
+          </a:bodyPr>
+          <a:lstStyle/>
+          <a:p>
+            <a:fld id="{4FAB73BC-B049-4115-A692-8D63A059BFB8}" type="slidenum">
+              <a:rPr lang="en-US" smtClean="0"/>
+              <a:t>4</a:t>
+            </a:fld>
+            <a:endParaRPr lang="en-US" dirty="0"/>
+          </a:p>
+        </p:txBody>
+      </p:sp>
     </p:spTree>
     <p:extLst>
       <p:ext uri="{BB962C8B-B14F-4D97-AF65-F5344CB8AC3E}">
@@ -5024,18 +5257,7 @@
                 <a:ea typeface="Consolas" charset="0"/>
                 <a:cs typeface="Consolas" charset="0"/>
               </a:rPr>
-              <a:t> </a:t>
-            </a:r>
-            <a:r>
-              <a:rPr lang="en-US" dirty="0" smtClean="0">
-                <a:solidFill>
-                  <a:srgbClr val="FF0000"/>
-                </a:solidFill>
-                <a:latin typeface="Consolas" charset="0"/>
-                <a:ea typeface="Consolas" charset="0"/>
-                <a:cs typeface="Consolas" charset="0"/>
-              </a:rPr>
-              <a:t>{</a:t>
+              <a:t> {</a:t>
             </a:r>
           </a:p>
           <a:p>
@@ -5328,18 +5550,7 @@
                 <a:ea typeface="Consolas" charset="0"/>
                 <a:cs typeface="Consolas" charset="0"/>
               </a:rPr>
-              <a:t> </a:t>
-            </a:r>
-            <a:r>
-              <a:rPr lang="en-US" dirty="0" smtClean="0">
-                <a:solidFill>
-                  <a:srgbClr val="0070C0"/>
-                </a:solidFill>
-                <a:latin typeface="Consolas" charset="0"/>
-                <a:ea typeface="Consolas" charset="0"/>
-                <a:cs typeface="Consolas" charset="0"/>
-              </a:rPr>
-              <a:t>{</a:t>
+              <a:t> {</a:t>
             </a:r>
           </a:p>
           <a:p>
@@ -5786,6 +5997,31 @@
           </a:fontRef>
         </p:style>
       </p:cxnSp>
+      <p:sp>
+        <p:nvSpPr>
+          <p:cNvPr id="7" name="Slide Number Placeholder 6"/>
+          <p:cNvSpPr>
+            <a:spLocks noGrp="1"/>
+          </p:cNvSpPr>
+          <p:nvPr>
+            <p:ph type="sldNum" sz="quarter" idx="12"/>
+          </p:nvPr>
+        </p:nvSpPr>
+        <p:spPr/>
+        <p:txBody>
+          <a:bodyPr>
+            <a:normAutofit lnSpcReduction="10000"/>
+          </a:bodyPr>
+          <a:lstStyle/>
+          <a:p>
+            <a:fld id="{4FAB73BC-B049-4115-A692-8D63A059BFB8}" type="slidenum">
+              <a:rPr lang="en-US" smtClean="0"/>
+              <a:t>5</a:t>
+            </a:fld>
+            <a:endParaRPr lang="en-US" dirty="0"/>
+          </a:p>
+        </p:txBody>
+      </p:sp>
     </p:spTree>
     <p:extLst>
       <p:ext uri="{BB962C8B-B14F-4D97-AF65-F5344CB8AC3E}">
@@ -5967,18 +6203,7 @@
                 <a:ea typeface="Consolas" charset="0"/>
                 <a:cs typeface="Consolas" charset="0"/>
               </a:rPr>
-              <a:t> </a:t>
-            </a:r>
-            <a:r>
-              <a:rPr lang="en-US" dirty="0" smtClean="0">
-                <a:solidFill>
-                  <a:srgbClr val="FF0000"/>
-                </a:solidFill>
-                <a:latin typeface="Consolas" charset="0"/>
-                <a:ea typeface="Consolas" charset="0"/>
-                <a:cs typeface="Consolas" charset="0"/>
-              </a:rPr>
-              <a:t>{</a:t>
+              <a:t> {</a:t>
             </a:r>
           </a:p>
           <a:p>
@@ -6249,18 +6474,7 @@
                 <a:ea typeface="Consolas" charset="0"/>
                 <a:cs typeface="Consolas" charset="0"/>
               </a:rPr>
-              <a:t> </a:t>
-            </a:r>
-            <a:r>
-              <a:rPr lang="en-US" dirty="0" smtClean="0">
-                <a:solidFill>
-                  <a:srgbClr val="0070C0"/>
-                </a:solidFill>
-                <a:latin typeface="Consolas" charset="0"/>
-                <a:ea typeface="Consolas" charset="0"/>
-                <a:cs typeface="Consolas" charset="0"/>
-              </a:rPr>
-              <a:t>{</a:t>
+              <a:t> {</a:t>
             </a:r>
           </a:p>
           <a:p>
@@ -6773,6 +6987,31 @@
           </a:fontRef>
         </p:style>
       </p:cxnSp>
+      <p:sp>
+        <p:nvSpPr>
+          <p:cNvPr id="7" name="Slide Number Placeholder 6"/>
+          <p:cNvSpPr>
+            <a:spLocks noGrp="1"/>
+          </p:cNvSpPr>
+          <p:nvPr>
+            <p:ph type="sldNum" sz="quarter" idx="12"/>
+          </p:nvPr>
+        </p:nvSpPr>
+        <p:spPr/>
+        <p:txBody>
+          <a:bodyPr>
+            <a:normAutofit lnSpcReduction="10000"/>
+          </a:bodyPr>
+          <a:lstStyle/>
+          <a:p>
+            <a:fld id="{4FAB73BC-B049-4115-A692-8D63A059BFB8}" type="slidenum">
+              <a:rPr lang="en-US" smtClean="0"/>
+              <a:t>6</a:t>
+            </a:fld>
+            <a:endParaRPr lang="en-US" dirty="0"/>
+          </a:p>
+        </p:txBody>
+      </p:sp>
     </p:spTree>
     <p:extLst>
       <p:ext uri="{BB962C8B-B14F-4D97-AF65-F5344CB8AC3E}">
@@ -7040,18 +7279,7 @@
                 <a:ea typeface="Consolas" charset="0"/>
                 <a:cs typeface="Consolas" charset="0"/>
               </a:rPr>
-              <a:t> </a:t>
-            </a:r>
-            <a:r>
-              <a:rPr lang="en-US" dirty="0" smtClean="0">
-                <a:solidFill>
-                  <a:srgbClr val="FF0000"/>
-                </a:solidFill>
-                <a:latin typeface="Consolas" charset="0"/>
-                <a:ea typeface="Consolas" charset="0"/>
-                <a:cs typeface="Consolas" charset="0"/>
-              </a:rPr>
-              <a:t>{</a:t>
+              <a:t> {</a:t>
             </a:r>
           </a:p>
           <a:p>
@@ -7615,6 +7843,31 @@
           </a:fontRef>
         </p:style>
       </p:cxnSp>
+      <p:sp>
+        <p:nvSpPr>
+          <p:cNvPr id="7" name="Slide Number Placeholder 6"/>
+          <p:cNvSpPr>
+            <a:spLocks noGrp="1"/>
+          </p:cNvSpPr>
+          <p:nvPr>
+            <p:ph type="sldNum" sz="quarter" idx="12"/>
+          </p:nvPr>
+        </p:nvSpPr>
+        <p:spPr/>
+        <p:txBody>
+          <a:bodyPr>
+            <a:normAutofit lnSpcReduction="10000"/>
+          </a:bodyPr>
+          <a:lstStyle/>
+          <a:p>
+            <a:fld id="{4FAB73BC-B049-4115-A692-8D63A059BFB8}" type="slidenum">
+              <a:rPr lang="en-US" smtClean="0"/>
+              <a:t>7</a:t>
+            </a:fld>
+            <a:endParaRPr lang="en-US" dirty="0"/>
+          </a:p>
+        </p:txBody>
+      </p:sp>
     </p:spTree>
     <p:extLst>
       <p:ext uri="{BB962C8B-B14F-4D97-AF65-F5344CB8AC3E}">
@@ -7853,18 +8106,7 @@
                 <a:ea typeface="Consolas" charset="0"/>
                 <a:cs typeface="Consolas" charset="0"/>
               </a:rPr>
-              <a:t> </a:t>
-            </a:r>
-            <a:r>
-              <a:rPr lang="en-US" dirty="0" smtClean="0">
-                <a:solidFill>
-                  <a:srgbClr val="FF0000"/>
-                </a:solidFill>
-                <a:latin typeface="Consolas" charset="0"/>
-                <a:ea typeface="Consolas" charset="0"/>
-                <a:cs typeface="Consolas" charset="0"/>
-              </a:rPr>
-              <a:t>{</a:t>
+              <a:t> {</a:t>
             </a:r>
           </a:p>
           <a:p>
@@ -7958,18 +8200,7 @@
                 <a:ea typeface="Consolas" charset="0"/>
                 <a:cs typeface="Consolas" charset="0"/>
               </a:rPr>
-              <a:t> </a:t>
-            </a:r>
-            <a:r>
-              <a:rPr lang="en-US" dirty="0" smtClean="0">
-                <a:solidFill>
-                  <a:srgbClr val="0070C0"/>
-                </a:solidFill>
-                <a:latin typeface="Consolas" charset="0"/>
-                <a:ea typeface="Consolas" charset="0"/>
-                <a:cs typeface="Consolas" charset="0"/>
-              </a:rPr>
-              <a:t>implements Displayable {</a:t>
+              <a:t> implements Displayable {</a:t>
             </a:r>
           </a:p>
           <a:p>
@@ -8477,6 +8708,31 @@
           </a:fontRef>
         </p:style>
       </p:cxnSp>
+      <p:sp>
+        <p:nvSpPr>
+          <p:cNvPr id="7" name="Slide Number Placeholder 6"/>
+          <p:cNvSpPr>
+            <a:spLocks noGrp="1"/>
+          </p:cNvSpPr>
+          <p:nvPr>
+            <p:ph type="sldNum" sz="quarter" idx="12"/>
+          </p:nvPr>
+        </p:nvSpPr>
+        <p:spPr/>
+        <p:txBody>
+          <a:bodyPr>
+            <a:normAutofit lnSpcReduction="10000"/>
+          </a:bodyPr>
+          <a:lstStyle/>
+          <a:p>
+            <a:fld id="{4FAB73BC-B049-4115-A692-8D63A059BFB8}" type="slidenum">
+              <a:rPr lang="en-US" smtClean="0"/>
+              <a:t>8</a:t>
+            </a:fld>
+            <a:endParaRPr lang="en-US" dirty="0"/>
+          </a:p>
+        </p:txBody>
+      </p:sp>
     </p:spTree>
     <p:extLst>
       <p:ext uri="{BB962C8B-B14F-4D97-AF65-F5344CB8AC3E}">
@@ -8546,6 +8802,31 @@
           <a:lstStyle/>
           <a:p>
             <a:endParaRPr lang="en-US"/>
+          </a:p>
+        </p:txBody>
+      </p:sp>
+      <p:sp>
+        <p:nvSpPr>
+          <p:cNvPr id="2" name="Slide Number Placeholder 1"/>
+          <p:cNvSpPr>
+            <a:spLocks noGrp="1"/>
+          </p:cNvSpPr>
+          <p:nvPr>
+            <p:ph type="sldNum" sz="quarter" idx="12"/>
+          </p:nvPr>
+        </p:nvSpPr>
+        <p:spPr/>
+        <p:txBody>
+          <a:bodyPr>
+            <a:normAutofit lnSpcReduction="10000"/>
+          </a:bodyPr>
+          <a:lstStyle/>
+          <a:p>
+            <a:fld id="{4FAB73BC-B049-4115-A692-8D63A059BFB8}" type="slidenum">
+              <a:rPr lang="en-US" smtClean="0"/>
+              <a:t>9</a:t>
+            </a:fld>
+            <a:endParaRPr lang="en-US" dirty="0"/>
           </a:p>
         </p:txBody>
       </p:sp>

</xml_diff>

<commit_message>
week 11: update slides
</commit_message>
<xml_diff>
--- a/week_11/week_11.pptx
+++ b/week_11/week_11.pptx
@@ -207,7 +207,7 @@
           <a:p>
             <a:fld id="{A756DEA0-F944-5946-9B95-BC7B5255CD05}" type="datetimeFigureOut">
               <a:rPr lang="en-US" smtClean="0"/>
-              <a:t>11/7/16</a:t>
+              <a:t>4/3/17</a:t>
             </a:fld>
             <a:endParaRPr lang="en-US"/>
           </a:p>
@@ -1231,7 +1231,7 @@
           <a:p>
             <a:fld id="{8B5407FB-C825-9C4D-8451-58033DE0CF2D}" type="datetime1">
               <a:rPr lang="en-US" smtClean="0"/>
-              <a:t>11/7/16</a:t>
+              <a:t>4/3/17</a:t>
             </a:fld>
             <a:endParaRPr lang="en-US" dirty="0"/>
           </a:p>
@@ -1455,7 +1455,7 @@
           <a:p>
             <a:fld id="{C03C80DE-649F-CA47-8397-FF23D44ABC92}" type="datetime1">
               <a:rPr lang="en-US" smtClean="0"/>
-              <a:t>11/7/16</a:t>
+              <a:t>4/3/17</a:t>
             </a:fld>
             <a:endParaRPr lang="en-US" dirty="0"/>
           </a:p>
@@ -1630,7 +1630,7 @@
           <a:p>
             <a:fld id="{474EE0A6-D4D1-FF4F-B942-9BB047377A42}" type="datetime1">
               <a:rPr lang="en-US" smtClean="0"/>
-              <a:t>11/7/16</a:t>
+              <a:t>4/3/17</a:t>
             </a:fld>
             <a:endParaRPr lang="en-US" dirty="0"/>
           </a:p>
@@ -1795,7 +1795,7 @@
           <a:p>
             <a:fld id="{4E97B23F-FEF2-9049-955E-C458BD097967}" type="datetime1">
               <a:rPr lang="en-US" smtClean="0"/>
-              <a:t>11/7/16</a:t>
+              <a:t>4/3/17</a:t>
             </a:fld>
             <a:endParaRPr lang="en-US" dirty="0"/>
           </a:p>
@@ -2044,7 +2044,7 @@
           <a:p>
             <a:fld id="{6E6D3AFA-72A7-D34E-B937-1D67CE948542}" type="datetime1">
               <a:rPr lang="en-US" smtClean="0"/>
-              <a:t>11/7/16</a:t>
+              <a:t>4/3/17</a:t>
             </a:fld>
             <a:endParaRPr lang="en-US" dirty="0"/>
           </a:p>
@@ -2365,7 +2365,7 @@
           <a:p>
             <a:fld id="{E929E1B2-ACA4-7F4D-AA2C-5371E017FAC7}" type="datetime1">
               <a:rPr lang="en-US" smtClean="0"/>
-              <a:t>11/7/16</a:t>
+              <a:t>4/3/17</a:t>
             </a:fld>
             <a:endParaRPr lang="en-US" dirty="0"/>
           </a:p>
@@ -2811,7 +2811,7 @@
           <a:p>
             <a:fld id="{3A7BD360-ECD2-B144-A5ED-A7C5F795C5F1}" type="datetime1">
               <a:rPr lang="en-US" smtClean="0"/>
-              <a:t>11/7/16</a:t>
+              <a:t>4/3/17</a:t>
             </a:fld>
             <a:endParaRPr lang="en-US" dirty="0"/>
           </a:p>
@@ -2924,7 +2924,7 @@
           <a:p>
             <a:fld id="{DCE6E47C-EAD0-FA4C-8638-0AE0CDF046E0}" type="datetime1">
               <a:rPr lang="en-US" smtClean="0"/>
-              <a:t>11/7/16</a:t>
+              <a:t>4/3/17</a:t>
             </a:fld>
             <a:endParaRPr lang="en-US" dirty="0"/>
           </a:p>
@@ -3014,7 +3014,7 @@
           <a:p>
             <a:fld id="{A99A3AC6-9E28-7346-97E0-EBA853790398}" type="datetime1">
               <a:rPr lang="en-US" smtClean="0"/>
-              <a:t>11/7/16</a:t>
+              <a:t>4/3/17</a:t>
             </a:fld>
             <a:endParaRPr lang="en-US" dirty="0"/>
           </a:p>
@@ -3296,7 +3296,7 @@
           <a:p>
             <a:fld id="{730EDE96-7094-FD4E-A8E8-23591E9AE0A8}" type="datetime1">
               <a:rPr lang="en-US" smtClean="0"/>
-              <a:t>11/7/16</a:t>
+              <a:t>4/3/17</a:t>
             </a:fld>
             <a:endParaRPr lang="en-US" dirty="0"/>
           </a:p>
@@ -3616,7 +3616,7 @@
           <a:p>
             <a:fld id="{705121F9-9A99-DE47-838E-F10F04A1E6EA}" type="datetime1">
               <a:rPr lang="en-US" smtClean="0"/>
-              <a:t>11/7/16</a:t>
+              <a:t>4/3/17</a:t>
             </a:fld>
             <a:endParaRPr lang="en-US" dirty="0"/>
           </a:p>
@@ -3865,7 +3865,7 @@
           <a:p>
             <a:fld id="{822E863E-F977-F741-8CEE-71C161BDA56D}" type="datetime1">
               <a:rPr lang="en-US" smtClean="0"/>
-              <a:t>11/7/16</a:t>
+              <a:t>4/3/17</a:t>
             </a:fld>
             <a:endParaRPr lang="en-US" dirty="0"/>
           </a:p>
@@ -4390,13 +4390,8 @@
           <a:p>
             <a:r>
               <a:rPr lang="en-US" dirty="0" smtClean="0"/>
-              <a:t>Week 11: Listeners and Anonymous </a:t>
-            </a:r>
-            <a:r>
-              <a:rPr lang="en-US" dirty="0" smtClean="0"/>
-              <a:t>Classes</a:t>
-            </a:r>
-            <a:endParaRPr lang="en-US" dirty="0" smtClean="0"/>
+              <a:t>Week 11: Listeners and Anonymous Classes</a:t>
+            </a:r>
           </a:p>
         </p:txBody>
       </p:sp>
@@ -5186,7 +5181,17 @@
           <a:p>
             <a:r>
               <a:rPr lang="en-US" sz="2800" dirty="0" smtClean="0"/>
-              <a:t>Has access to outer class’s static methods and fields</a:t>
+              <a:t>Has access to outer class’s static methods and </a:t>
+            </a:r>
+            <a:r>
+              <a:rPr lang="en-US" sz="2800" dirty="0" smtClean="0"/>
+              <a:t>fields</a:t>
+            </a:r>
+          </a:p>
+          <a:p>
+            <a:r>
+              <a:rPr lang="en-US" sz="2800" dirty="0" smtClean="0"/>
+              <a:t>Don’t need instance of outer class to access inner class</a:t>
             </a:r>
             <a:endParaRPr lang="en-US" sz="2800" dirty="0"/>
           </a:p>

</xml_diff>